<commit_message>
LF Rebase pass 5
</commit_message>
<xml_diff>
--- a/_images/bbu-legal-architecture-diagrams.pptx
+++ b/_images/bbu-legal-architecture-diagrams.pptx
@@ -5,16 +5,17 @@
     <p:sldMasterId id="2147483661" r:id="rId1"/>
   </p:sldMasterIdLst>
   <p:notesMasterIdLst>
-    <p:notesMasterId r:id="rId6"/>
+    <p:notesMasterId r:id="rId7"/>
   </p:notesMasterIdLst>
   <p:handoutMasterIdLst>
-    <p:handoutMasterId r:id="rId7"/>
+    <p:handoutMasterId r:id="rId8"/>
   </p:handoutMasterIdLst>
   <p:sldIdLst>
     <p:sldId id="1459" r:id="rId2"/>
     <p:sldId id="1496" r:id="rId3"/>
-    <p:sldId id="1476" r:id="rId4"/>
+    <p:sldId id="1498" r:id="rId4"/>
     <p:sldId id="1495" r:id="rId5"/>
+    <p:sldId id="1497" r:id="rId6"/>
   </p:sldIdLst>
   <p:sldSz cx="9144000" cy="5715000" type="screen16x10"/>
   <p:notesSz cx="6858000" cy="9144000"/>
@@ -234,7 +235,7 @@
           <a:p>
             <a:fld id="{DBF11AD0-CBC6-9146-A8F0-0AF52C67ACE2}" type="datetime1">
               <a:rPr lang="en-US" smtClean="0"/>
-              <a:t>3/3/20</a:t>
+              <a:t>4/24/20</a:t>
             </a:fld>
             <a:endParaRPr lang="en-US"/>
           </a:p>
@@ -401,7 +402,7 @@
           <a:p>
             <a:fld id="{6CACBC2F-B1A2-974F-A6BB-4C92B82E6131}" type="datetime1">
               <a:rPr lang="en-US" smtClean="0"/>
-              <a:t>3/3/20</a:t>
+              <a:t>4/24/20</a:t>
             </a:fld>
             <a:endParaRPr lang="en-US"/>
           </a:p>
@@ -864,7 +865,7 @@
           <a:p>
             <a:fld id="{FEF5F77A-F38F-AD4A-B998-DCCE283B6C3A}" type="datetime1">
               <a:rPr lang="en-US" smtClean="0"/>
-              <a:t>3/3/20</a:t>
+              <a:t>4/24/20</a:t>
             </a:fld>
             <a:endParaRPr lang="en-US" dirty="0"/>
           </a:p>
@@ -1061,7 +1062,7 @@
           <a:p>
             <a:fld id="{2657E1D8-07DC-EF44-A2DA-32CB82A18F47}" type="datetime1">
               <a:rPr lang="en-US" smtClean="0"/>
-              <a:t>3/3/20</a:t>
+              <a:t>4/24/20</a:t>
             </a:fld>
             <a:endParaRPr lang="en-US" dirty="0"/>
           </a:p>
@@ -1268,7 +1269,7 @@
           <a:p>
             <a:fld id="{E34F1AEB-FE29-684A-B567-D6665AFF2C81}" type="datetime1">
               <a:rPr lang="en-US" smtClean="0"/>
-              <a:t>3/3/20</a:t>
+              <a:t>4/24/20</a:t>
             </a:fld>
             <a:endParaRPr lang="en-US" dirty="0"/>
           </a:p>
@@ -1466,7 +1467,7 @@
           <a:p>
             <a:fld id="{BE868F33-CB55-8945-9605-C543A320443F}" type="datetime1">
               <a:rPr lang="en-US" smtClean="0"/>
-              <a:t>3/3/20</a:t>
+              <a:t>4/24/20</a:t>
             </a:fld>
             <a:endParaRPr lang="en-US" dirty="0"/>
           </a:p>
@@ -1740,7 +1741,7 @@
           <a:p>
             <a:fld id="{71044EA3-D82B-4044-A7F8-2C032BAE9DD8}" type="datetime1">
               <a:rPr lang="en-US" smtClean="0"/>
-              <a:t>3/3/20</a:t>
+              <a:t>4/24/20</a:t>
             </a:fld>
             <a:endParaRPr lang="en-US" dirty="0"/>
           </a:p>
@@ -2054,7 +2055,7 @@
           <a:p>
             <a:fld id="{5B64554D-C496-B245-B1B0-E787FCBA68EB}" type="datetime1">
               <a:rPr lang="en-US" smtClean="0"/>
-              <a:t>3/3/20</a:t>
+              <a:t>4/24/20</a:t>
             </a:fld>
             <a:endParaRPr lang="en-US" dirty="0"/>
           </a:p>
@@ -2507,7 +2508,7 @@
           <a:p>
             <a:fld id="{DB0F923C-3F7F-094A-8718-7D1631A25B71}" type="datetime1">
               <a:rPr lang="en-US" smtClean="0"/>
-              <a:t>3/3/20</a:t>
+              <a:t>4/24/20</a:t>
             </a:fld>
             <a:endParaRPr lang="en-US" dirty="0"/>
           </a:p>
@@ -2653,7 +2654,7 @@
           <a:p>
             <a:fld id="{56055DA3-9ABF-2845-88FF-4E5BD6A99381}" type="datetime1">
               <a:rPr lang="en-US" smtClean="0"/>
-              <a:t>3/3/20</a:t>
+              <a:t>4/24/20</a:t>
             </a:fld>
             <a:endParaRPr lang="en-US" dirty="0"/>
           </a:p>
@@ -2777,7 +2778,7 @@
           <a:p>
             <a:fld id="{2537E26C-13A3-BC49-A155-B19B36A7A70F}" type="datetime1">
               <a:rPr lang="en-US" smtClean="0"/>
-              <a:t>3/3/20</a:t>
+              <a:t>4/24/20</a:t>
             </a:fld>
             <a:endParaRPr lang="en-US" dirty="0"/>
           </a:p>
@@ -3081,7 +3082,7 @@
           <a:p>
             <a:fld id="{42D56183-E8FC-554D-B08B-29FD94B81980}" type="datetime1">
               <a:rPr lang="en-US" smtClean="0"/>
-              <a:t>3/3/20</a:t>
+              <a:t>4/24/20</a:t>
             </a:fld>
             <a:endParaRPr lang="en-US" dirty="0"/>
           </a:p>
@@ -3365,7 +3366,7 @@
           <a:p>
             <a:fld id="{C89106FC-3E18-A346-8776-5BB95F891DAF}" type="datetime1">
               <a:rPr lang="en-US" smtClean="0"/>
-              <a:t>3/3/20</a:t>
+              <a:t>4/24/20</a:t>
             </a:fld>
             <a:endParaRPr lang="en-US" dirty="0"/>
           </a:p>
@@ -5610,18 +5611,10 @@
             <a:r>
               <a:rPr lang="en-US" sz="2400" b="1" dirty="0">
                 <a:solidFill>
-                  <a:srgbClr val="F0A727"/>
-                </a:solidFill>
-              </a:rPr>
-              <a:t>       </a:t>
-            </a:r>
-            <a:r>
-              <a:rPr lang="en-US" sz="2400" b="1" dirty="0">
-                <a:solidFill>
                   <a:schemeClr val="tx1"/>
                 </a:solidFill>
               </a:rPr>
-              <a:t>Bedrock Consortium Governance Framework </a:t>
+              <a:t>Bedrock Business Utility Governance Framework </a:t>
             </a:r>
           </a:p>
         </p:txBody>
@@ -5923,7 +5916,7 @@
         <p:spPr>
           <a:xfrm>
             <a:off x="152399" y="3759369"/>
-            <a:ext cx="2057401" cy="1015663"/>
+            <a:ext cx="2057401" cy="1200329"/>
           </a:xfrm>
           <a:prstGeom prst="rect">
             <a:avLst/>
@@ -5938,7 +5931,7 @@
           <a:p>
             <a:r>
               <a:rPr lang="en-US" sz="1200" dirty="0"/>
-              <a:t>Membership Types required to run Hyperledger Indy</a:t>
+              <a:t>Membership Types, known as Stewards, are required to run Hyperledger Indy</a:t>
             </a:r>
           </a:p>
           <a:p>
@@ -5954,7 +5947,7 @@
             </a:pPr>
             <a:r>
               <a:rPr lang="en-US" sz="1200" dirty="0"/>
-              <a:t>Founding Stewards</a:t>
+              <a:t>Governing Members</a:t>
             </a:r>
           </a:p>
           <a:p>
@@ -5964,7 +5957,7 @@
             </a:pPr>
             <a:r>
               <a:rPr lang="en-US" sz="1200" dirty="0"/>
-              <a:t>Stewards</a:t>
+              <a:t>Operational Members</a:t>
             </a:r>
           </a:p>
         </p:txBody>
@@ -6009,7 +6002,7 @@
             </a:pPr>
             <a:r>
               <a:rPr lang="en-US" sz="1200" dirty="0"/>
-              <a:t>Founding Stewards</a:t>
+              <a:t>Governing Members</a:t>
             </a:r>
           </a:p>
           <a:p>
@@ -6019,7 +6012,7 @@
             </a:pPr>
             <a:r>
               <a:rPr lang="en-US" sz="1200" dirty="0"/>
-              <a:t>Stewards</a:t>
+              <a:t>Operational Members</a:t>
             </a:r>
           </a:p>
           <a:p>
@@ -6029,7 +6022,7 @@
             </a:pPr>
             <a:r>
               <a:rPr lang="en-US" sz="1200" dirty="0"/>
-              <a:t>Subscriber</a:t>
+              <a:t>Subscriber Members</a:t>
             </a:r>
           </a:p>
           <a:p>
@@ -6051,7 +6044,7 @@
     </p:spTree>
     <p:extLst>
       <p:ext uri="{BB962C8B-B14F-4D97-AF65-F5344CB8AC3E}">
-        <p14:creationId xmlns:p14="http://schemas.microsoft.com/office/powerpoint/2010/main" val="2370127987"/>
+        <p14:creationId xmlns:p14="http://schemas.microsoft.com/office/powerpoint/2010/main" val="1515877477"/>
       </p:ext>
     </p:extLst>
   </p:cSld>
@@ -6302,7 +6295,7 @@
         </p:nvSpPr>
         <p:spPr>
           <a:xfrm>
-            <a:off x="5257800" y="2338871"/>
+            <a:off x="5257800" y="2400300"/>
             <a:ext cx="3690438" cy="682680"/>
           </a:xfrm>
           <a:prstGeom prst="roundRect">
@@ -6383,8 +6376,8 @@
         </p:nvCxnSpPr>
         <p:spPr>
           <a:xfrm>
-            <a:off x="7103019" y="3021551"/>
-            <a:ext cx="5259" cy="765187"/>
+            <a:off x="7103019" y="3082980"/>
+            <a:ext cx="5259" cy="703758"/>
           </a:xfrm>
           <a:prstGeom prst="straightConnector1">
             <a:avLst/>
@@ -6476,14 +6469,15 @@
           <p:cNvPr id="29" name="Straight Arrow Connector 28"/>
           <p:cNvCxnSpPr>
             <a:cxnSpLocks/>
+            <a:stCxn id="31" idx="2"/>
             <a:endCxn id="12" idx="0"/>
           </p:cNvCxnSpPr>
           <p:nvPr/>
         </p:nvCxnSpPr>
         <p:spPr>
-          <a:xfrm>
-            <a:off x="7103019" y="1650690"/>
-            <a:ext cx="0" cy="688181"/>
+          <a:xfrm flipH="1">
+            <a:off x="7103019" y="1584969"/>
+            <a:ext cx="5258" cy="815331"/>
           </a:xfrm>
           <a:prstGeom prst="straightConnector1">
             <a:avLst/>
@@ -6554,7 +6548,7 @@
         </p:nvSpPr>
         <p:spPr>
           <a:xfrm>
-            <a:off x="1611425" y="2533507"/>
+            <a:off x="1611425" y="2651647"/>
             <a:ext cx="3625337" cy="304800"/>
           </a:xfrm>
           <a:prstGeom prst="leftRightArrow">
@@ -6684,7 +6678,7 @@
         </p:nvSpPr>
         <p:spPr>
           <a:xfrm>
-            <a:off x="3967530" y="2145041"/>
+            <a:off x="3967530" y="2263181"/>
             <a:ext cx="914400" cy="990599"/>
           </a:xfrm>
           <a:prstGeom prst="foldedCorner">
@@ -6846,8 +6840,8 @@
         </p:nvSpPr>
         <p:spPr>
           <a:xfrm>
-            <a:off x="6161170" y="1684704"/>
-            <a:ext cx="914400" cy="461665"/>
+            <a:off x="6941840" y="1543428"/>
+            <a:ext cx="1307861" cy="461665"/>
           </a:xfrm>
           <a:prstGeom prst="rect">
             <a:avLst/>
@@ -7375,8 +7369,8 @@
         </p:nvSpPr>
         <p:spPr>
           <a:xfrm>
-            <a:off x="1942493" y="2205961"/>
-            <a:ext cx="914400" cy="990599"/>
+            <a:off x="1942493" y="2324101"/>
+            <a:ext cx="914400" cy="2311227"/>
           </a:xfrm>
           <a:prstGeom prst="foldedCorner">
             <a:avLst/>
@@ -7416,7 +7410,7 @@
                   <a:srgbClr val="000090"/>
                 </a:solidFill>
               </a:rPr>
-              <a:t>Subscriber Agreement</a:t>
+              <a:t>Participation Agreement</a:t>
             </a:r>
           </a:p>
         </p:txBody>
@@ -7429,7 +7423,7 @@
         </p:nvSpPr>
         <p:spPr>
           <a:xfrm>
-            <a:off x="2944863" y="2184911"/>
+            <a:off x="2944863" y="2303051"/>
             <a:ext cx="914400" cy="990599"/>
           </a:xfrm>
           <a:prstGeom prst="foldedCorner">
@@ -7475,10 +7469,1574 @@
           </a:p>
         </p:txBody>
       </p:sp>
+      <p:cxnSp>
+        <p:nvCxnSpPr>
+          <p:cNvPr id="4" name="Straight Connector 3">
+            <a:extLst>
+              <a:ext uri="{FF2B5EF4-FFF2-40B4-BE49-F238E27FC236}">
+                <a16:creationId xmlns:a16="http://schemas.microsoft.com/office/drawing/2014/main" id="{A515C109-DC24-F14E-885E-28737301F67C}"/>
+              </a:ext>
+            </a:extLst>
+          </p:cNvPr>
+          <p:cNvCxnSpPr>
+            <a:cxnSpLocks/>
+          </p:cNvCxnSpPr>
+          <p:nvPr/>
+        </p:nvCxnSpPr>
+        <p:spPr>
+          <a:xfrm>
+            <a:off x="1618779" y="1993167"/>
+            <a:ext cx="7329459" cy="0"/>
+          </a:xfrm>
+          <a:prstGeom prst="line">
+            <a:avLst/>
+          </a:prstGeom>
+          <a:ln w="15875" cmpd="sng">
+            <a:prstDash val="dash"/>
+            <a:tailEnd type="none"/>
+          </a:ln>
+          <a:effectLst/>
+        </p:spPr>
+        <p:style>
+          <a:lnRef idx="2">
+            <a:schemeClr val="dk1"/>
+          </a:lnRef>
+          <a:fillRef idx="0">
+            <a:schemeClr val="dk1"/>
+          </a:fillRef>
+          <a:effectRef idx="1">
+            <a:schemeClr val="dk1"/>
+          </a:effectRef>
+          <a:fontRef idx="minor">
+            <a:schemeClr val="tx1"/>
+          </a:fontRef>
+        </p:style>
+      </p:cxnSp>
+      <p:sp>
+        <p:nvSpPr>
+          <p:cNvPr id="37" name="TextBox 36">
+            <a:extLst>
+              <a:ext uri="{FF2B5EF4-FFF2-40B4-BE49-F238E27FC236}">
+                <a16:creationId xmlns:a16="http://schemas.microsoft.com/office/drawing/2014/main" id="{5D94CB27-60D2-3245-B631-175FA0F2A382}"/>
+              </a:ext>
+            </a:extLst>
+          </p:cNvPr>
+          <p:cNvSpPr txBox="1"/>
+          <p:nvPr/>
+        </p:nvSpPr>
+        <p:spPr>
+          <a:xfrm>
+            <a:off x="1126816" y="1714500"/>
+            <a:ext cx="1535025" cy="253916"/>
+          </a:xfrm>
+          <a:prstGeom prst="rect">
+            <a:avLst/>
+          </a:prstGeom>
+          <a:noFill/>
+        </p:spPr>
+        <p:txBody>
+          <a:bodyPr wrap="square" rtlCol="0">
+            <a:spAutoFit/>
+          </a:bodyPr>
+          <a:lstStyle/>
+          <a:p>
+            <a:pPr algn="ctr"/>
+            <a:r>
+              <a:rPr lang="en-US" sz="1050" b="1" i="1" dirty="0">
+                <a:solidFill>
+                  <a:srgbClr val="0070C0"/>
+                </a:solidFill>
+                <a:latin typeface="IBM Plex Sans Condensed Text" panose="020B0506050203000203" pitchFamily="34" charset="77"/>
+              </a:rPr>
+              <a:t>Anyone</a:t>
+            </a:r>
+            <a:endParaRPr lang="en-US" sz="1200" b="1" i="1" dirty="0">
+              <a:solidFill>
+                <a:srgbClr val="0070C0"/>
+              </a:solidFill>
+              <a:latin typeface="IBM Plex Sans Condensed Text" panose="020B0506050203000203" pitchFamily="34" charset="77"/>
+            </a:endParaRPr>
+          </a:p>
+        </p:txBody>
+      </p:sp>
+      <p:sp>
+        <p:nvSpPr>
+          <p:cNvPr id="47" name="TextBox 46">
+            <a:extLst>
+              <a:ext uri="{FF2B5EF4-FFF2-40B4-BE49-F238E27FC236}">
+                <a16:creationId xmlns:a16="http://schemas.microsoft.com/office/drawing/2014/main" id="{8F9DA153-65DC-884C-AB88-62980DD50E94}"/>
+              </a:ext>
+            </a:extLst>
+          </p:cNvPr>
+          <p:cNvSpPr txBox="1"/>
+          <p:nvPr/>
+        </p:nvSpPr>
+        <p:spPr>
+          <a:xfrm>
+            <a:off x="1174980" y="1996220"/>
+            <a:ext cx="1535025" cy="253916"/>
+          </a:xfrm>
+          <a:prstGeom prst="rect">
+            <a:avLst/>
+          </a:prstGeom>
+          <a:noFill/>
+        </p:spPr>
+        <p:txBody>
+          <a:bodyPr wrap="square" rtlCol="0">
+            <a:spAutoFit/>
+          </a:bodyPr>
+          <a:lstStyle/>
+          <a:p>
+            <a:pPr algn="ctr"/>
+            <a:r>
+              <a:rPr lang="en-US" sz="1050" b="1" i="1" dirty="0">
+                <a:solidFill>
+                  <a:srgbClr val="0070C0"/>
+                </a:solidFill>
+                <a:latin typeface="IBM Plex Sans Condensed Text" panose="020B0506050203000203" pitchFamily="34" charset="77"/>
+              </a:rPr>
+              <a:t>Members</a:t>
+            </a:r>
+            <a:endParaRPr lang="en-US" sz="1200" b="1" i="1" dirty="0">
+              <a:solidFill>
+                <a:srgbClr val="0070C0"/>
+              </a:solidFill>
+              <a:latin typeface="IBM Plex Sans Condensed Text" panose="020B0506050203000203" pitchFamily="34" charset="77"/>
+            </a:endParaRPr>
+          </a:p>
+        </p:txBody>
+      </p:sp>
     </p:spTree>
     <p:extLst>
       <p:ext uri="{BB962C8B-B14F-4D97-AF65-F5344CB8AC3E}">
         <p14:creationId xmlns:p14="http://schemas.microsoft.com/office/powerpoint/2010/main" val="1195186982"/>
+      </p:ext>
+    </p:extLst>
+  </p:cSld>
+  <p:clrMapOvr>
+    <a:masterClrMapping/>
+  </p:clrMapOvr>
+</p:sld>
+</file>
+
+<file path=ppt/slides/slide5.xml><?xml version="1.0" encoding="utf-8"?>
+<p:sld xmlns:a="http://schemas.openxmlformats.org/drawingml/2006/main" xmlns:r="http://schemas.openxmlformats.org/officeDocument/2006/relationships" xmlns:p="http://schemas.openxmlformats.org/presentationml/2006/main">
+  <p:cSld>
+    <p:spTree>
+      <p:nvGrpSpPr>
+        <p:cNvPr id="1" name=""/>
+        <p:cNvGrpSpPr/>
+        <p:nvPr/>
+      </p:nvGrpSpPr>
+      <p:grpSpPr>
+        <a:xfrm>
+          <a:off x="0" y="0"/>
+          <a:ext cx="0" cy="0"/>
+          <a:chOff x="0" y="0"/>
+          <a:chExt cx="0" cy="0"/>
+        </a:xfrm>
+      </p:grpSpPr>
+      <p:sp>
+        <p:nvSpPr>
+          <p:cNvPr id="59" name="Rectangle 58"/>
+          <p:cNvSpPr/>
+          <p:nvPr/>
+        </p:nvSpPr>
+        <p:spPr>
+          <a:xfrm>
+            <a:off x="5247281" y="125951"/>
+            <a:ext cx="3700957" cy="3660787"/>
+          </a:xfrm>
+          <a:prstGeom prst="rect">
+            <a:avLst/>
+          </a:prstGeom>
+          <a:solidFill>
+            <a:schemeClr val="accent1">
+              <a:lumMod val="20000"/>
+              <a:lumOff val="80000"/>
+              <a:alpha val="17000"/>
+            </a:schemeClr>
+          </a:solidFill>
+          <a:ln>
+            <a:noFill/>
+          </a:ln>
+        </p:spPr>
+        <p:style>
+          <a:lnRef idx="1">
+            <a:schemeClr val="accent1"/>
+          </a:lnRef>
+          <a:fillRef idx="3">
+            <a:schemeClr val="accent1"/>
+          </a:fillRef>
+          <a:effectRef idx="2">
+            <a:schemeClr val="accent1"/>
+          </a:effectRef>
+          <a:fontRef idx="minor">
+            <a:schemeClr val="lt1"/>
+          </a:fontRef>
+        </p:style>
+        <p:txBody>
+          <a:bodyPr rtlCol="0" anchor="ctr"/>
+          <a:lstStyle/>
+          <a:p>
+            <a:pPr algn="ctr"/>
+            <a:endParaRPr lang="en-US"/>
+          </a:p>
+        </p:txBody>
+      </p:sp>
+      <p:sp>
+        <p:nvSpPr>
+          <p:cNvPr id="3" name="Rounded Rectangle 2"/>
+          <p:cNvSpPr/>
+          <p:nvPr/>
+        </p:nvSpPr>
+        <p:spPr>
+          <a:xfrm>
+            <a:off x="5257800" y="5037704"/>
+            <a:ext cx="3700956" cy="533400"/>
+          </a:xfrm>
+          <a:prstGeom prst="roundRect">
+            <a:avLst/>
+          </a:prstGeom>
+          <a:solidFill>
+            <a:srgbClr val="FF6600"/>
+          </a:solidFill>
+          <a:ln>
+            <a:noFill/>
+          </a:ln>
+        </p:spPr>
+        <p:style>
+          <a:lnRef idx="1">
+            <a:schemeClr val="accent1"/>
+          </a:lnRef>
+          <a:fillRef idx="3">
+            <a:schemeClr val="accent1"/>
+          </a:fillRef>
+          <a:effectRef idx="2">
+            <a:schemeClr val="accent1"/>
+          </a:effectRef>
+          <a:fontRef idx="minor">
+            <a:schemeClr val="lt1"/>
+          </a:fontRef>
+        </p:style>
+        <p:txBody>
+          <a:bodyPr rtlCol="0" anchor="ctr" anchorCtr="0"/>
+          <a:lstStyle/>
+          <a:p>
+            <a:pPr algn="ctr"/>
+            <a:r>
+              <a:rPr lang="en-US" sz="2000" dirty="0"/>
+              <a:t>DID Ledger</a:t>
+            </a:r>
+          </a:p>
+        </p:txBody>
+      </p:sp>
+      <p:sp>
+        <p:nvSpPr>
+          <p:cNvPr id="8" name="Rounded Rectangle 7"/>
+          <p:cNvSpPr/>
+          <p:nvPr/>
+        </p:nvSpPr>
+        <p:spPr>
+          <a:xfrm>
+            <a:off x="5257800" y="3786738"/>
+            <a:ext cx="3700956" cy="647659"/>
+          </a:xfrm>
+          <a:prstGeom prst="roundRect">
+            <a:avLst/>
+          </a:prstGeom>
+          <a:solidFill>
+            <a:schemeClr val="accent1">
+              <a:lumMod val="75000"/>
+            </a:schemeClr>
+          </a:solidFill>
+          <a:ln>
+            <a:noFill/>
+          </a:ln>
+        </p:spPr>
+        <p:style>
+          <a:lnRef idx="1">
+            <a:schemeClr val="accent1"/>
+          </a:lnRef>
+          <a:fillRef idx="3">
+            <a:schemeClr val="accent1"/>
+          </a:fillRef>
+          <a:effectRef idx="2">
+            <a:schemeClr val="accent1"/>
+          </a:effectRef>
+          <a:fontRef idx="minor">
+            <a:schemeClr val="lt1"/>
+          </a:fontRef>
+        </p:style>
+        <p:txBody>
+          <a:bodyPr rtlCol="0" anchor="ctr" anchorCtr="0"/>
+          <a:lstStyle/>
+          <a:p>
+            <a:pPr algn="ctr"/>
+            <a:r>
+              <a:rPr lang="en-US" b="1" dirty="0"/>
+              <a:t>Stewards </a:t>
+            </a:r>
+            <a:br>
+              <a:rPr lang="en-US" b="1" dirty="0"/>
+            </a:br>
+            <a:r>
+              <a:rPr lang="en-US" sz="1600" dirty="0"/>
+              <a:t>(acting collectively as the Steward pool)</a:t>
+            </a:r>
+          </a:p>
+        </p:txBody>
+      </p:sp>
+      <p:sp>
+        <p:nvSpPr>
+          <p:cNvPr id="11" name="Rounded Rectangle 10"/>
+          <p:cNvSpPr/>
+          <p:nvPr/>
+        </p:nvSpPr>
+        <p:spPr>
+          <a:xfrm>
+            <a:off x="195756" y="887950"/>
+            <a:ext cx="1415670" cy="3556815"/>
+          </a:xfrm>
+          <a:prstGeom prst="roundRect">
+            <a:avLst>
+              <a:gd name="adj" fmla="val 13832"/>
+            </a:avLst>
+          </a:prstGeom>
+          <a:solidFill>
+            <a:srgbClr val="39A539"/>
+          </a:solidFill>
+          <a:ln w="19050" cmpd="sng">
+            <a:noFill/>
+          </a:ln>
+          <a:effectLst/>
+        </p:spPr>
+        <p:style>
+          <a:lnRef idx="1">
+            <a:schemeClr val="accent1"/>
+          </a:lnRef>
+          <a:fillRef idx="3">
+            <a:schemeClr val="accent1"/>
+          </a:fillRef>
+          <a:effectRef idx="2">
+            <a:schemeClr val="accent1"/>
+          </a:effectRef>
+          <a:fontRef idx="minor">
+            <a:schemeClr val="lt1"/>
+          </a:fontRef>
+        </p:style>
+        <p:txBody>
+          <a:bodyPr rtlCol="0" anchor="ctr" anchorCtr="0"/>
+          <a:lstStyle/>
+          <a:p>
+            <a:pPr algn="ctr"/>
+            <a:r>
+              <a:rPr lang="en-US" b="1" dirty="0">
+                <a:solidFill>
+                  <a:schemeClr val="bg1"/>
+                </a:solidFill>
+              </a:rPr>
+              <a:t>Bedrock Consortium</a:t>
+            </a:r>
+          </a:p>
+          <a:p>
+            <a:pPr algn="ctr"/>
+            <a:r>
+              <a:rPr lang="en-US" sz="1600" dirty="0">
+                <a:solidFill>
+                  <a:schemeClr val="bg1"/>
+                </a:solidFill>
+              </a:rPr>
+              <a:t>(Designated Data Controller)</a:t>
+            </a:r>
+          </a:p>
+        </p:txBody>
+      </p:sp>
+      <p:sp>
+        <p:nvSpPr>
+          <p:cNvPr id="12" name="Rounded Rectangle 11"/>
+          <p:cNvSpPr/>
+          <p:nvPr/>
+        </p:nvSpPr>
+        <p:spPr>
+          <a:xfrm>
+            <a:off x="5257800" y="2338871"/>
+            <a:ext cx="3690438" cy="682680"/>
+          </a:xfrm>
+          <a:prstGeom prst="roundRect">
+            <a:avLst/>
+          </a:prstGeom>
+          <a:solidFill>
+            <a:srgbClr val="376092"/>
+          </a:solidFill>
+          <a:ln>
+            <a:noFill/>
+          </a:ln>
+        </p:spPr>
+        <p:style>
+          <a:lnRef idx="1">
+            <a:schemeClr val="accent1"/>
+          </a:lnRef>
+          <a:fillRef idx="3">
+            <a:schemeClr val="accent1"/>
+          </a:fillRef>
+          <a:effectRef idx="2">
+            <a:schemeClr val="accent1"/>
+          </a:effectRef>
+          <a:fontRef idx="minor">
+            <a:schemeClr val="lt1"/>
+          </a:fontRef>
+        </p:style>
+        <p:txBody>
+          <a:bodyPr rtlCol="0" anchor="ctr" anchorCtr="0"/>
+          <a:lstStyle/>
+          <a:p>
+            <a:pPr algn="ctr"/>
+            <a:r>
+              <a:rPr lang="en-US" b="1" dirty="0"/>
+              <a:t>Transaction Endorsers</a:t>
+            </a:r>
+          </a:p>
+        </p:txBody>
+      </p:sp>
+      <p:sp>
+        <p:nvSpPr>
+          <p:cNvPr id="20" name="TextBox 19"/>
+          <p:cNvSpPr txBox="1"/>
+          <p:nvPr/>
+        </p:nvSpPr>
+        <p:spPr>
+          <a:xfrm>
+            <a:off x="5265150" y="226975"/>
+            <a:ext cx="3690438" cy="338554"/>
+          </a:xfrm>
+          <a:prstGeom prst="rect">
+            <a:avLst/>
+          </a:prstGeom>
+          <a:noFill/>
+        </p:spPr>
+        <p:txBody>
+          <a:bodyPr wrap="square" rtlCol="0">
+            <a:spAutoFit/>
+          </a:bodyPr>
+          <a:lstStyle/>
+          <a:p>
+            <a:pPr algn="ctr"/>
+            <a:r>
+              <a:rPr lang="en-US" sz="1600" dirty="0"/>
+              <a:t>Permissioned Write Access</a:t>
+            </a:r>
+          </a:p>
+        </p:txBody>
+      </p:sp>
+      <p:cxnSp>
+        <p:nvCxnSpPr>
+          <p:cNvPr id="25" name="Straight Arrow Connector 24"/>
+          <p:cNvCxnSpPr>
+            <a:cxnSpLocks/>
+            <a:stCxn id="12" idx="2"/>
+            <a:endCxn id="8" idx="0"/>
+          </p:cNvCxnSpPr>
+          <p:nvPr/>
+        </p:nvCxnSpPr>
+        <p:spPr>
+          <a:xfrm>
+            <a:off x="7103019" y="3021551"/>
+            <a:ext cx="5259" cy="765187"/>
+          </a:xfrm>
+          <a:prstGeom prst="straightConnector1">
+            <a:avLst/>
+          </a:prstGeom>
+          <a:ln w="38100" cmpd="sng">
+            <a:tailEnd type="arrow"/>
+          </a:ln>
+          <a:effectLst/>
+        </p:spPr>
+        <p:style>
+          <a:lnRef idx="2">
+            <a:schemeClr val="dk1"/>
+          </a:lnRef>
+          <a:fillRef idx="0">
+            <a:schemeClr val="dk1"/>
+          </a:fillRef>
+          <a:effectRef idx="1">
+            <a:schemeClr val="dk1"/>
+          </a:effectRef>
+          <a:fontRef idx="minor">
+            <a:schemeClr val="tx1"/>
+          </a:fontRef>
+        </p:style>
+      </p:cxnSp>
+      <p:sp>
+        <p:nvSpPr>
+          <p:cNvPr id="31" name="Rounded Rectangle 30"/>
+          <p:cNvSpPr/>
+          <p:nvPr/>
+        </p:nvSpPr>
+        <p:spPr>
+          <a:xfrm>
+            <a:off x="5257798" y="565529"/>
+            <a:ext cx="3700957" cy="1019440"/>
+          </a:xfrm>
+          <a:prstGeom prst="roundRect">
+            <a:avLst/>
+          </a:prstGeom>
+          <a:solidFill>
+            <a:srgbClr val="39A539"/>
+          </a:solidFill>
+          <a:ln>
+            <a:noFill/>
+          </a:ln>
+        </p:spPr>
+        <p:style>
+          <a:lnRef idx="1">
+            <a:schemeClr val="accent1"/>
+          </a:lnRef>
+          <a:fillRef idx="3">
+            <a:schemeClr val="accent1"/>
+          </a:fillRef>
+          <a:effectRef idx="2">
+            <a:schemeClr val="accent1"/>
+          </a:effectRef>
+          <a:fontRef idx="minor">
+            <a:schemeClr val="lt1"/>
+          </a:fontRef>
+        </p:style>
+        <p:txBody>
+          <a:bodyPr rtlCol="0" anchor="ctr" anchorCtr="0"/>
+          <a:lstStyle/>
+          <a:p>
+            <a:pPr algn="ctr"/>
+            <a:r>
+              <a:rPr lang="en-US" b="1" dirty="0"/>
+              <a:t>Transaction Authors</a:t>
+            </a:r>
+            <a:br>
+              <a:rPr lang="en-US" dirty="0"/>
+            </a:br>
+            <a:r>
+              <a:rPr lang="en-US" sz="1600" dirty="0"/>
+              <a:t>(Primary Data Controllers)</a:t>
+            </a:r>
+          </a:p>
+          <a:p>
+            <a:pPr algn="ctr"/>
+            <a:endParaRPr lang="en-US" sz="1600" dirty="0"/>
+          </a:p>
+          <a:p>
+            <a:pPr algn="ctr"/>
+            <a:endParaRPr lang="en-US" sz="1600" dirty="0"/>
+          </a:p>
+        </p:txBody>
+      </p:sp>
+      <p:cxnSp>
+        <p:nvCxnSpPr>
+          <p:cNvPr id="29" name="Straight Arrow Connector 28"/>
+          <p:cNvCxnSpPr>
+            <a:cxnSpLocks/>
+            <a:endCxn id="12" idx="0"/>
+          </p:cNvCxnSpPr>
+          <p:nvPr/>
+        </p:nvCxnSpPr>
+        <p:spPr>
+          <a:xfrm>
+            <a:off x="7103019" y="1650690"/>
+            <a:ext cx="0" cy="688181"/>
+          </a:xfrm>
+          <a:prstGeom prst="straightConnector1">
+            <a:avLst/>
+          </a:prstGeom>
+          <a:ln w="38100" cmpd="sng">
+            <a:tailEnd type="arrow"/>
+          </a:ln>
+          <a:effectLst/>
+        </p:spPr>
+        <p:style>
+          <a:lnRef idx="2">
+            <a:schemeClr val="dk1"/>
+          </a:lnRef>
+          <a:fillRef idx="0">
+            <a:schemeClr val="dk1"/>
+          </a:fillRef>
+          <a:effectRef idx="1">
+            <a:schemeClr val="dk1"/>
+          </a:effectRef>
+          <a:fontRef idx="minor">
+            <a:schemeClr val="tx1"/>
+          </a:fontRef>
+        </p:style>
+      </p:cxnSp>
+      <p:sp>
+        <p:nvSpPr>
+          <p:cNvPr id="26" name="Left-Right Arrow 25"/>
+          <p:cNvSpPr/>
+          <p:nvPr/>
+        </p:nvSpPr>
+        <p:spPr>
+          <a:xfrm>
+            <a:off x="1618779" y="1097046"/>
+            <a:ext cx="3617983" cy="304800"/>
+          </a:xfrm>
+          <a:prstGeom prst="leftRightArrow">
+            <a:avLst/>
+          </a:prstGeom>
+        </p:spPr>
+        <p:style>
+          <a:lnRef idx="1">
+            <a:schemeClr val="accent1"/>
+          </a:lnRef>
+          <a:fillRef idx="3">
+            <a:schemeClr val="accent1"/>
+          </a:fillRef>
+          <a:effectRef idx="2">
+            <a:schemeClr val="accent1"/>
+          </a:effectRef>
+          <a:fontRef idx="minor">
+            <a:schemeClr val="lt1"/>
+          </a:fontRef>
+        </p:style>
+        <p:txBody>
+          <a:bodyPr rtlCol="0" anchor="ctr"/>
+          <a:lstStyle/>
+          <a:p>
+            <a:pPr algn="ctr"/>
+            <a:endParaRPr lang="en-US"/>
+          </a:p>
+        </p:txBody>
+      </p:sp>
+      <p:sp>
+        <p:nvSpPr>
+          <p:cNvPr id="35" name="Left-Right Arrow 34"/>
+          <p:cNvSpPr/>
+          <p:nvPr/>
+        </p:nvSpPr>
+        <p:spPr>
+          <a:xfrm>
+            <a:off x="1611425" y="2533507"/>
+            <a:ext cx="3625337" cy="304800"/>
+          </a:xfrm>
+          <a:prstGeom prst="leftRightArrow">
+            <a:avLst/>
+          </a:prstGeom>
+        </p:spPr>
+        <p:style>
+          <a:lnRef idx="1">
+            <a:schemeClr val="accent1"/>
+          </a:lnRef>
+          <a:fillRef idx="3">
+            <a:schemeClr val="accent1"/>
+          </a:fillRef>
+          <a:effectRef idx="2">
+            <a:schemeClr val="accent1"/>
+          </a:effectRef>
+          <a:fontRef idx="minor">
+            <a:schemeClr val="lt1"/>
+          </a:fontRef>
+        </p:style>
+        <p:txBody>
+          <a:bodyPr rtlCol="0" anchor="ctr"/>
+          <a:lstStyle/>
+          <a:p>
+            <a:pPr algn="ctr"/>
+            <a:endParaRPr lang="en-US"/>
+          </a:p>
+        </p:txBody>
+      </p:sp>
+      <p:sp>
+        <p:nvSpPr>
+          <p:cNvPr id="36" name="Left-Right Arrow 35"/>
+          <p:cNvSpPr/>
+          <p:nvPr/>
+        </p:nvSpPr>
+        <p:spPr>
+          <a:xfrm>
+            <a:off x="1618779" y="3978160"/>
+            <a:ext cx="3617983" cy="304800"/>
+          </a:xfrm>
+          <a:prstGeom prst="leftRightArrow">
+            <a:avLst/>
+          </a:prstGeom>
+        </p:spPr>
+        <p:style>
+          <a:lnRef idx="1">
+            <a:schemeClr val="accent1"/>
+          </a:lnRef>
+          <a:fillRef idx="3">
+            <a:schemeClr val="accent1"/>
+          </a:fillRef>
+          <a:effectRef idx="2">
+            <a:schemeClr val="accent1"/>
+          </a:effectRef>
+          <a:fontRef idx="minor">
+            <a:schemeClr val="lt1"/>
+          </a:fontRef>
+        </p:style>
+        <p:txBody>
+          <a:bodyPr rtlCol="0" anchor="ctr"/>
+          <a:lstStyle/>
+          <a:p>
+            <a:pPr algn="ctr"/>
+            <a:endParaRPr lang="en-US"/>
+          </a:p>
+        </p:txBody>
+      </p:sp>
+      <p:sp>
+        <p:nvSpPr>
+          <p:cNvPr id="27" name="Folded Corner 26"/>
+          <p:cNvSpPr/>
+          <p:nvPr/>
+        </p:nvSpPr>
+        <p:spPr>
+          <a:xfrm>
+            <a:off x="2944863" y="720129"/>
+            <a:ext cx="914400" cy="990599"/>
+          </a:xfrm>
+          <a:prstGeom prst="foldedCorner">
+            <a:avLst/>
+          </a:prstGeom>
+          <a:solidFill>
+            <a:schemeClr val="accent6">
+              <a:lumMod val="20000"/>
+              <a:lumOff val="80000"/>
+            </a:schemeClr>
+          </a:solidFill>
+          <a:ln>
+            <a:noFill/>
+          </a:ln>
+        </p:spPr>
+        <p:style>
+          <a:lnRef idx="1">
+            <a:schemeClr val="accent1"/>
+          </a:lnRef>
+          <a:fillRef idx="3">
+            <a:schemeClr val="accent1"/>
+          </a:fillRef>
+          <a:effectRef idx="2">
+            <a:schemeClr val="accent1"/>
+          </a:effectRef>
+          <a:fontRef idx="minor">
+            <a:schemeClr val="lt1"/>
+          </a:fontRef>
+        </p:style>
+        <p:txBody>
+          <a:bodyPr lIns="0" rIns="0" rtlCol="0" anchor="ctr"/>
+          <a:lstStyle/>
+          <a:p>
+            <a:pPr algn="ctr"/>
+            <a:r>
+              <a:rPr lang="en-US" sz="1200" dirty="0">
+                <a:solidFill>
+                  <a:srgbClr val="000090"/>
+                </a:solidFill>
+              </a:rPr>
+              <a:t>Transaction Author Agreement</a:t>
+            </a:r>
+          </a:p>
+        </p:txBody>
+      </p:sp>
+      <p:sp>
+        <p:nvSpPr>
+          <p:cNvPr id="38" name="Folded Corner 37"/>
+          <p:cNvSpPr/>
+          <p:nvPr/>
+        </p:nvSpPr>
+        <p:spPr>
+          <a:xfrm>
+            <a:off x="3967530" y="2145041"/>
+            <a:ext cx="914400" cy="990599"/>
+          </a:xfrm>
+          <a:prstGeom prst="foldedCorner">
+            <a:avLst/>
+          </a:prstGeom>
+          <a:solidFill>
+            <a:schemeClr val="accent6">
+              <a:lumMod val="20000"/>
+              <a:lumOff val="80000"/>
+            </a:schemeClr>
+          </a:solidFill>
+          <a:ln>
+            <a:noFill/>
+          </a:ln>
+        </p:spPr>
+        <p:style>
+          <a:lnRef idx="1">
+            <a:schemeClr val="accent1"/>
+          </a:lnRef>
+          <a:fillRef idx="3">
+            <a:schemeClr val="accent1"/>
+          </a:fillRef>
+          <a:effectRef idx="2">
+            <a:schemeClr val="accent1"/>
+          </a:effectRef>
+          <a:fontRef idx="minor">
+            <a:schemeClr val="lt1"/>
+          </a:fontRef>
+        </p:style>
+        <p:txBody>
+          <a:bodyPr lIns="0" rIns="0" rtlCol="0" anchor="ctr"/>
+          <a:lstStyle/>
+          <a:p>
+            <a:pPr algn="ctr"/>
+            <a:r>
+              <a:rPr lang="en-US" sz="1200" dirty="0">
+                <a:solidFill>
+                  <a:srgbClr val="000090"/>
+                </a:solidFill>
+              </a:rPr>
+              <a:t>Data Processing Agreement</a:t>
+            </a:r>
+          </a:p>
+        </p:txBody>
+      </p:sp>
+      <p:sp>
+        <p:nvSpPr>
+          <p:cNvPr id="42" name="Folded Corner 41"/>
+          <p:cNvSpPr/>
+          <p:nvPr/>
+        </p:nvSpPr>
+        <p:spPr>
+          <a:xfrm>
+            <a:off x="3988311" y="3644731"/>
+            <a:ext cx="914400" cy="990599"/>
+          </a:xfrm>
+          <a:prstGeom prst="foldedCorner">
+            <a:avLst/>
+          </a:prstGeom>
+          <a:solidFill>
+            <a:schemeClr val="accent6">
+              <a:lumMod val="20000"/>
+              <a:lumOff val="80000"/>
+            </a:schemeClr>
+          </a:solidFill>
+          <a:ln>
+            <a:noFill/>
+          </a:ln>
+        </p:spPr>
+        <p:style>
+          <a:lnRef idx="1">
+            <a:schemeClr val="accent1"/>
+          </a:lnRef>
+          <a:fillRef idx="3">
+            <a:schemeClr val="accent1"/>
+          </a:fillRef>
+          <a:effectRef idx="2">
+            <a:schemeClr val="accent1"/>
+          </a:effectRef>
+          <a:fontRef idx="minor">
+            <a:schemeClr val="lt1"/>
+          </a:fontRef>
+        </p:style>
+        <p:txBody>
+          <a:bodyPr lIns="0" rIns="0" rtlCol="0" anchor="ctr"/>
+          <a:lstStyle/>
+          <a:p>
+            <a:pPr algn="ctr"/>
+            <a:r>
+              <a:rPr lang="en-US" sz="1200" dirty="0">
+                <a:solidFill>
+                  <a:srgbClr val="000090"/>
+                </a:solidFill>
+              </a:rPr>
+              <a:t>Data Processing Agreement</a:t>
+            </a:r>
+          </a:p>
+        </p:txBody>
+      </p:sp>
+      <p:sp>
+        <p:nvSpPr>
+          <p:cNvPr id="43" name="Folded Corner 42"/>
+          <p:cNvSpPr/>
+          <p:nvPr/>
+        </p:nvSpPr>
+        <p:spPr>
+          <a:xfrm>
+            <a:off x="2929558" y="3644730"/>
+            <a:ext cx="914400" cy="990599"/>
+          </a:xfrm>
+          <a:prstGeom prst="foldedCorner">
+            <a:avLst/>
+          </a:prstGeom>
+          <a:solidFill>
+            <a:schemeClr val="accent6">
+              <a:lumMod val="20000"/>
+              <a:lumOff val="80000"/>
+            </a:schemeClr>
+          </a:solidFill>
+          <a:ln>
+            <a:noFill/>
+          </a:ln>
+        </p:spPr>
+        <p:style>
+          <a:lnRef idx="1">
+            <a:schemeClr val="accent1"/>
+          </a:lnRef>
+          <a:fillRef idx="3">
+            <a:schemeClr val="accent1"/>
+          </a:fillRef>
+          <a:effectRef idx="2">
+            <a:schemeClr val="accent1"/>
+          </a:effectRef>
+          <a:fontRef idx="minor">
+            <a:schemeClr val="lt1"/>
+          </a:fontRef>
+        </p:style>
+        <p:txBody>
+          <a:bodyPr lIns="0" rIns="0" rtlCol="0" anchor="ctr"/>
+          <a:lstStyle/>
+          <a:p>
+            <a:pPr algn="ctr"/>
+            <a:r>
+              <a:rPr lang="en-US" sz="1200" dirty="0">
+                <a:solidFill>
+                  <a:srgbClr val="000090"/>
+                </a:solidFill>
+              </a:rPr>
+              <a:t>Steward Agreement</a:t>
+            </a:r>
+          </a:p>
+        </p:txBody>
+      </p:sp>
+      <p:sp>
+        <p:nvSpPr>
+          <p:cNvPr id="30" name="TextBox 29"/>
+          <p:cNvSpPr txBox="1"/>
+          <p:nvPr/>
+        </p:nvSpPr>
+        <p:spPr>
+          <a:xfrm>
+            <a:off x="6161170" y="1684704"/>
+            <a:ext cx="914400" cy="461665"/>
+          </a:xfrm>
+          <a:prstGeom prst="rect">
+            <a:avLst/>
+          </a:prstGeom>
+          <a:noFill/>
+        </p:spPr>
+        <p:txBody>
+          <a:bodyPr wrap="square" rtlCol="0">
+            <a:spAutoFit/>
+          </a:bodyPr>
+          <a:lstStyle/>
+          <a:p>
+            <a:pPr algn="ctr"/>
+            <a:r>
+              <a:rPr lang="en-US" sz="1200" dirty="0"/>
+              <a:t>Submits Transaction</a:t>
+            </a:r>
+          </a:p>
+        </p:txBody>
+      </p:sp>
+      <p:cxnSp>
+        <p:nvCxnSpPr>
+          <p:cNvPr id="44" name="Straight Arrow Connector 43"/>
+          <p:cNvCxnSpPr>
+            <a:cxnSpLocks/>
+            <a:stCxn id="8" idx="2"/>
+            <a:endCxn id="3" idx="0"/>
+          </p:cNvCxnSpPr>
+          <p:nvPr/>
+        </p:nvCxnSpPr>
+        <p:spPr>
+          <a:xfrm>
+            <a:off x="7108278" y="4434397"/>
+            <a:ext cx="0" cy="603307"/>
+          </a:xfrm>
+          <a:prstGeom prst="straightConnector1">
+            <a:avLst/>
+          </a:prstGeom>
+          <a:ln w="38100" cmpd="sng">
+            <a:tailEnd type="arrow"/>
+          </a:ln>
+          <a:effectLst/>
+        </p:spPr>
+        <p:style>
+          <a:lnRef idx="2">
+            <a:schemeClr val="dk1"/>
+          </a:lnRef>
+          <a:fillRef idx="0">
+            <a:schemeClr val="dk1"/>
+          </a:fillRef>
+          <a:effectRef idx="1">
+            <a:schemeClr val="dk1"/>
+          </a:effectRef>
+          <a:fontRef idx="minor">
+            <a:schemeClr val="tx1"/>
+          </a:fontRef>
+        </p:style>
+      </p:cxnSp>
+      <p:sp>
+        <p:nvSpPr>
+          <p:cNvPr id="45" name="TextBox 44"/>
+          <p:cNvSpPr txBox="1"/>
+          <p:nvPr/>
+        </p:nvSpPr>
+        <p:spPr>
+          <a:xfrm>
+            <a:off x="7138571" y="3082366"/>
+            <a:ext cx="914400" cy="461665"/>
+          </a:xfrm>
+          <a:prstGeom prst="rect">
+            <a:avLst/>
+          </a:prstGeom>
+          <a:noFill/>
+        </p:spPr>
+        <p:txBody>
+          <a:bodyPr wrap="square" rtlCol="0">
+            <a:spAutoFit/>
+          </a:bodyPr>
+          <a:lstStyle/>
+          <a:p>
+            <a:pPr algn="ctr"/>
+            <a:r>
+              <a:rPr lang="en-US" sz="1200" dirty="0"/>
+              <a:t>Endorses Transaction</a:t>
+            </a:r>
+          </a:p>
+        </p:txBody>
+      </p:sp>
+      <p:sp>
+        <p:nvSpPr>
+          <p:cNvPr id="46" name="TextBox 45"/>
+          <p:cNvSpPr txBox="1"/>
+          <p:nvPr/>
+        </p:nvSpPr>
+        <p:spPr>
+          <a:xfrm>
+            <a:off x="6064597" y="4453034"/>
+            <a:ext cx="914400" cy="461665"/>
+          </a:xfrm>
+          <a:prstGeom prst="rect">
+            <a:avLst/>
+          </a:prstGeom>
+          <a:noFill/>
+        </p:spPr>
+        <p:txBody>
+          <a:bodyPr wrap="square" rtlCol="0">
+            <a:spAutoFit/>
+          </a:bodyPr>
+          <a:lstStyle/>
+          <a:p>
+            <a:pPr algn="ctr"/>
+            <a:r>
+              <a:rPr lang="en-US" sz="1200" dirty="0"/>
+              <a:t>Writes Transaction</a:t>
+            </a:r>
+          </a:p>
+        </p:txBody>
+      </p:sp>
+      <p:sp>
+        <p:nvSpPr>
+          <p:cNvPr id="55" name="Rectangle 54"/>
+          <p:cNvSpPr/>
+          <p:nvPr/>
+        </p:nvSpPr>
+        <p:spPr>
+          <a:xfrm>
+            <a:off x="357696" y="4717144"/>
+            <a:ext cx="228600" cy="228600"/>
+          </a:xfrm>
+          <a:prstGeom prst="rect">
+            <a:avLst/>
+          </a:prstGeom>
+          <a:solidFill>
+            <a:srgbClr val="39A539"/>
+          </a:solidFill>
+          <a:ln>
+            <a:noFill/>
+          </a:ln>
+        </p:spPr>
+        <p:style>
+          <a:lnRef idx="1">
+            <a:schemeClr val="accent1"/>
+          </a:lnRef>
+          <a:fillRef idx="3">
+            <a:schemeClr val="accent1"/>
+          </a:fillRef>
+          <a:effectRef idx="2">
+            <a:schemeClr val="accent1"/>
+          </a:effectRef>
+          <a:fontRef idx="minor">
+            <a:schemeClr val="lt1"/>
+          </a:fontRef>
+        </p:style>
+        <p:txBody>
+          <a:bodyPr rtlCol="0" anchor="ctr"/>
+          <a:lstStyle/>
+          <a:p>
+            <a:pPr algn="ctr"/>
+            <a:endParaRPr lang="en-US"/>
+          </a:p>
+        </p:txBody>
+      </p:sp>
+      <p:sp>
+        <p:nvSpPr>
+          <p:cNvPr id="56" name="TextBox 55"/>
+          <p:cNvSpPr txBox="1"/>
+          <p:nvPr/>
+        </p:nvSpPr>
+        <p:spPr>
+          <a:xfrm>
+            <a:off x="549720" y="4714101"/>
+            <a:ext cx="1202880" cy="276999"/>
+          </a:xfrm>
+          <a:prstGeom prst="rect">
+            <a:avLst/>
+          </a:prstGeom>
+          <a:noFill/>
+        </p:spPr>
+        <p:txBody>
+          <a:bodyPr wrap="square" rtlCol="0">
+            <a:spAutoFit/>
+          </a:bodyPr>
+          <a:lstStyle/>
+          <a:p>
+            <a:r>
+              <a:rPr lang="en-US" sz="1200" dirty="0"/>
+              <a:t>Data Controller</a:t>
+            </a:r>
+          </a:p>
+        </p:txBody>
+      </p:sp>
+      <p:sp>
+        <p:nvSpPr>
+          <p:cNvPr id="57" name="Rectangle 56"/>
+          <p:cNvSpPr/>
+          <p:nvPr/>
+        </p:nvSpPr>
+        <p:spPr>
+          <a:xfrm>
+            <a:off x="357696" y="5011058"/>
+            <a:ext cx="228600" cy="228600"/>
+          </a:xfrm>
+          <a:prstGeom prst="rect">
+            <a:avLst/>
+          </a:prstGeom>
+          <a:solidFill>
+            <a:schemeClr val="accent1">
+              <a:lumMod val="75000"/>
+            </a:schemeClr>
+          </a:solidFill>
+          <a:ln>
+            <a:noFill/>
+          </a:ln>
+        </p:spPr>
+        <p:style>
+          <a:lnRef idx="1">
+            <a:schemeClr val="accent1"/>
+          </a:lnRef>
+          <a:fillRef idx="3">
+            <a:schemeClr val="accent1"/>
+          </a:fillRef>
+          <a:effectRef idx="2">
+            <a:schemeClr val="accent1"/>
+          </a:effectRef>
+          <a:fontRef idx="minor">
+            <a:schemeClr val="lt1"/>
+          </a:fontRef>
+        </p:style>
+        <p:txBody>
+          <a:bodyPr rtlCol="0" anchor="ctr"/>
+          <a:lstStyle/>
+          <a:p>
+            <a:pPr algn="ctr"/>
+            <a:endParaRPr lang="en-US"/>
+          </a:p>
+        </p:txBody>
+      </p:sp>
+      <p:sp>
+        <p:nvSpPr>
+          <p:cNvPr id="58" name="TextBox 57"/>
+          <p:cNvSpPr txBox="1"/>
+          <p:nvPr/>
+        </p:nvSpPr>
+        <p:spPr>
+          <a:xfrm>
+            <a:off x="549720" y="4991100"/>
+            <a:ext cx="1202880" cy="276999"/>
+          </a:xfrm>
+          <a:prstGeom prst="rect">
+            <a:avLst/>
+          </a:prstGeom>
+          <a:noFill/>
+        </p:spPr>
+        <p:txBody>
+          <a:bodyPr wrap="square" rtlCol="0">
+            <a:spAutoFit/>
+          </a:bodyPr>
+          <a:lstStyle/>
+          <a:p>
+            <a:r>
+              <a:rPr lang="en-US" sz="1200" dirty="0"/>
+              <a:t>Data Processor</a:t>
+            </a:r>
+          </a:p>
+        </p:txBody>
+      </p:sp>
+      <p:sp>
+        <p:nvSpPr>
+          <p:cNvPr id="7" name="Rounded Rectangle 6">
+            <a:extLst>
+              <a:ext uri="{FF2B5EF4-FFF2-40B4-BE49-F238E27FC236}">
+                <a16:creationId xmlns:a16="http://schemas.microsoft.com/office/drawing/2014/main" id="{D24EBB2E-2BF1-0B4D-ACA4-4A642424BF90}"/>
+              </a:ext>
+            </a:extLst>
+          </p:cNvPr>
+          <p:cNvSpPr/>
+          <p:nvPr/>
+        </p:nvSpPr>
+        <p:spPr>
+          <a:xfrm>
+            <a:off x="7786393" y="1137394"/>
+            <a:ext cx="961192" cy="304800"/>
+          </a:xfrm>
+          <a:prstGeom prst="roundRect">
+            <a:avLst/>
+          </a:prstGeom>
+          <a:solidFill>
+            <a:schemeClr val="accent4"/>
+          </a:solidFill>
+          <a:ln>
+            <a:noFill/>
+          </a:ln>
+        </p:spPr>
+        <p:style>
+          <a:lnRef idx="1">
+            <a:schemeClr val="accent1"/>
+          </a:lnRef>
+          <a:fillRef idx="3">
+            <a:schemeClr val="accent1"/>
+          </a:fillRef>
+          <a:effectRef idx="2">
+            <a:schemeClr val="accent1"/>
+          </a:effectRef>
+          <a:fontRef idx="minor">
+            <a:schemeClr val="lt1"/>
+          </a:fontRef>
+        </p:style>
+        <p:txBody>
+          <a:bodyPr rtlCol="0" anchor="ctr"/>
+          <a:lstStyle/>
+          <a:p>
+            <a:pPr algn="ctr"/>
+            <a:r>
+              <a:rPr lang="en-US" sz="1600" dirty="0"/>
+              <a:t>Verifier</a:t>
+            </a:r>
+            <a:endParaRPr lang="en-US" dirty="0"/>
+          </a:p>
+        </p:txBody>
+      </p:sp>
+      <p:sp>
+        <p:nvSpPr>
+          <p:cNvPr id="40" name="Rectangle 39">
+            <a:extLst>
+              <a:ext uri="{FF2B5EF4-FFF2-40B4-BE49-F238E27FC236}">
+                <a16:creationId xmlns:a16="http://schemas.microsoft.com/office/drawing/2014/main" id="{8D13C349-B576-704A-AF6B-DED98F45CA69}"/>
+              </a:ext>
+            </a:extLst>
+          </p:cNvPr>
+          <p:cNvSpPr/>
+          <p:nvPr/>
+        </p:nvSpPr>
+        <p:spPr>
+          <a:xfrm>
+            <a:off x="357696" y="5332238"/>
+            <a:ext cx="228600" cy="228600"/>
+          </a:xfrm>
+          <a:prstGeom prst="rect">
+            <a:avLst/>
+          </a:prstGeom>
+          <a:solidFill>
+            <a:schemeClr val="accent4"/>
+          </a:solidFill>
+          <a:ln>
+            <a:noFill/>
+          </a:ln>
+        </p:spPr>
+        <p:style>
+          <a:lnRef idx="1">
+            <a:schemeClr val="accent1"/>
+          </a:lnRef>
+          <a:fillRef idx="3">
+            <a:schemeClr val="accent1"/>
+          </a:fillRef>
+          <a:effectRef idx="2">
+            <a:schemeClr val="accent1"/>
+          </a:effectRef>
+          <a:fontRef idx="minor">
+            <a:schemeClr val="lt1"/>
+          </a:fontRef>
+        </p:style>
+        <p:txBody>
+          <a:bodyPr rtlCol="0" anchor="ctr"/>
+          <a:lstStyle/>
+          <a:p>
+            <a:pPr algn="ctr"/>
+            <a:endParaRPr lang="en-US"/>
+          </a:p>
+        </p:txBody>
+      </p:sp>
+      <p:sp>
+        <p:nvSpPr>
+          <p:cNvPr id="41" name="TextBox 40">
+            <a:extLst>
+              <a:ext uri="{FF2B5EF4-FFF2-40B4-BE49-F238E27FC236}">
+                <a16:creationId xmlns:a16="http://schemas.microsoft.com/office/drawing/2014/main" id="{81F7C996-0A51-4248-A3EE-21EC9F194D85}"/>
+              </a:ext>
+            </a:extLst>
+          </p:cNvPr>
+          <p:cNvSpPr txBox="1"/>
+          <p:nvPr/>
+        </p:nvSpPr>
+        <p:spPr>
+          <a:xfrm>
+            <a:off x="549720" y="5313455"/>
+            <a:ext cx="2345880" cy="276999"/>
+          </a:xfrm>
+          <a:prstGeom prst="rect">
+            <a:avLst/>
+          </a:prstGeom>
+          <a:noFill/>
+        </p:spPr>
+        <p:txBody>
+          <a:bodyPr wrap="square" rtlCol="0">
+            <a:spAutoFit/>
+          </a:bodyPr>
+          <a:lstStyle/>
+          <a:p>
+            <a:r>
+              <a:rPr lang="en-US" sz="1200" dirty="0"/>
+              <a:t>Example Ecosystem Users</a:t>
+            </a:r>
+          </a:p>
+        </p:txBody>
+      </p:sp>
+      <p:sp>
+        <p:nvSpPr>
+          <p:cNvPr id="48" name="Rounded Rectangle 47">
+            <a:extLst>
+              <a:ext uri="{FF2B5EF4-FFF2-40B4-BE49-F238E27FC236}">
+                <a16:creationId xmlns:a16="http://schemas.microsoft.com/office/drawing/2014/main" id="{73270079-987B-864C-BA34-41DC8899F17B}"/>
+              </a:ext>
+            </a:extLst>
+          </p:cNvPr>
+          <p:cNvSpPr/>
+          <p:nvPr/>
+        </p:nvSpPr>
+        <p:spPr>
+          <a:xfrm>
+            <a:off x="5403401" y="1145631"/>
+            <a:ext cx="961192" cy="304800"/>
+          </a:xfrm>
+          <a:prstGeom prst="roundRect">
+            <a:avLst/>
+          </a:prstGeom>
+          <a:solidFill>
+            <a:schemeClr val="accent4"/>
+          </a:solidFill>
+          <a:ln>
+            <a:noFill/>
+          </a:ln>
+        </p:spPr>
+        <p:style>
+          <a:lnRef idx="1">
+            <a:schemeClr val="accent1"/>
+          </a:lnRef>
+          <a:fillRef idx="3">
+            <a:schemeClr val="accent1"/>
+          </a:fillRef>
+          <a:effectRef idx="2">
+            <a:schemeClr val="accent1"/>
+          </a:effectRef>
+          <a:fontRef idx="minor">
+            <a:schemeClr val="lt1"/>
+          </a:fontRef>
+        </p:style>
+        <p:txBody>
+          <a:bodyPr rtlCol="0" anchor="ctr"/>
+          <a:lstStyle/>
+          <a:p>
+            <a:pPr algn="ctr"/>
+            <a:r>
+              <a:rPr lang="en-US" sz="1600" dirty="0"/>
+              <a:t>Issuer</a:t>
+            </a:r>
+            <a:endParaRPr lang="en-US" dirty="0"/>
+          </a:p>
+        </p:txBody>
+      </p:sp>
+      <p:sp>
+        <p:nvSpPr>
+          <p:cNvPr id="49" name="Rounded Rectangle 48">
+            <a:extLst>
+              <a:ext uri="{FF2B5EF4-FFF2-40B4-BE49-F238E27FC236}">
+                <a16:creationId xmlns:a16="http://schemas.microsoft.com/office/drawing/2014/main" id="{3C4E641E-8712-5C4E-B14F-B6741B391586}"/>
+              </a:ext>
+            </a:extLst>
+          </p:cNvPr>
+          <p:cNvSpPr/>
+          <p:nvPr/>
+        </p:nvSpPr>
+        <p:spPr>
+          <a:xfrm>
+            <a:off x="6580952" y="1145631"/>
+            <a:ext cx="961192" cy="304800"/>
+          </a:xfrm>
+          <a:prstGeom prst="roundRect">
+            <a:avLst/>
+          </a:prstGeom>
+          <a:solidFill>
+            <a:schemeClr val="accent4"/>
+          </a:solidFill>
+          <a:ln>
+            <a:noFill/>
+          </a:ln>
+        </p:spPr>
+        <p:style>
+          <a:lnRef idx="1">
+            <a:schemeClr val="accent1"/>
+          </a:lnRef>
+          <a:fillRef idx="3">
+            <a:schemeClr val="accent1"/>
+          </a:fillRef>
+          <a:effectRef idx="2">
+            <a:schemeClr val="accent1"/>
+          </a:effectRef>
+          <a:fontRef idx="minor">
+            <a:schemeClr val="lt1"/>
+          </a:fontRef>
+        </p:style>
+        <p:txBody>
+          <a:bodyPr rtlCol="0" anchor="ctr"/>
+          <a:lstStyle/>
+          <a:p>
+            <a:pPr algn="ctr"/>
+            <a:r>
+              <a:rPr lang="en-US" sz="1600" dirty="0"/>
+              <a:t>Holder</a:t>
+            </a:r>
+            <a:endParaRPr lang="en-US" dirty="0"/>
+          </a:p>
+        </p:txBody>
+      </p:sp>
+      <p:sp>
+        <p:nvSpPr>
+          <p:cNvPr id="50" name="Folded Corner 49">
+            <a:extLst>
+              <a:ext uri="{FF2B5EF4-FFF2-40B4-BE49-F238E27FC236}">
+                <a16:creationId xmlns:a16="http://schemas.microsoft.com/office/drawing/2014/main" id="{0E5416E3-F517-3F47-B2FA-56F497DFD470}"/>
+              </a:ext>
+            </a:extLst>
+          </p:cNvPr>
+          <p:cNvSpPr/>
+          <p:nvPr/>
+        </p:nvSpPr>
+        <p:spPr>
+          <a:xfrm>
+            <a:off x="1942493" y="2205961"/>
+            <a:ext cx="914400" cy="990599"/>
+          </a:xfrm>
+          <a:prstGeom prst="foldedCorner">
+            <a:avLst/>
+          </a:prstGeom>
+          <a:solidFill>
+            <a:schemeClr val="accent6">
+              <a:lumMod val="20000"/>
+              <a:lumOff val="80000"/>
+            </a:schemeClr>
+          </a:solidFill>
+          <a:ln>
+            <a:noFill/>
+          </a:ln>
+        </p:spPr>
+        <p:style>
+          <a:lnRef idx="1">
+            <a:schemeClr val="accent1"/>
+          </a:lnRef>
+          <a:fillRef idx="3">
+            <a:schemeClr val="accent1"/>
+          </a:fillRef>
+          <a:effectRef idx="2">
+            <a:schemeClr val="accent1"/>
+          </a:effectRef>
+          <a:fontRef idx="minor">
+            <a:schemeClr val="lt1"/>
+          </a:fontRef>
+        </p:style>
+        <p:txBody>
+          <a:bodyPr lIns="0" rIns="0" rtlCol="0" anchor="ctr"/>
+          <a:lstStyle/>
+          <a:p>
+            <a:pPr algn="ctr"/>
+            <a:r>
+              <a:rPr lang="en-US" sz="1200" dirty="0">
+                <a:solidFill>
+                  <a:srgbClr val="000090"/>
+                </a:solidFill>
+              </a:rPr>
+              <a:t>Subscriber Agreement</a:t>
+            </a:r>
+          </a:p>
+        </p:txBody>
+      </p:sp>
+      <p:sp>
+        <p:nvSpPr>
+          <p:cNvPr id="39" name="Folded Corner 38"/>
+          <p:cNvSpPr/>
+          <p:nvPr/>
+        </p:nvSpPr>
+        <p:spPr>
+          <a:xfrm>
+            <a:off x="2944863" y="2184911"/>
+            <a:ext cx="914400" cy="990599"/>
+          </a:xfrm>
+          <a:prstGeom prst="foldedCorner">
+            <a:avLst/>
+          </a:prstGeom>
+          <a:solidFill>
+            <a:schemeClr val="accent6">
+              <a:lumMod val="20000"/>
+              <a:lumOff val="80000"/>
+            </a:schemeClr>
+          </a:solidFill>
+          <a:ln>
+            <a:noFill/>
+          </a:ln>
+        </p:spPr>
+        <p:style>
+          <a:lnRef idx="1">
+            <a:schemeClr val="accent1"/>
+          </a:lnRef>
+          <a:fillRef idx="3">
+            <a:schemeClr val="accent1"/>
+          </a:fillRef>
+          <a:effectRef idx="2">
+            <a:schemeClr val="accent1"/>
+          </a:effectRef>
+          <a:fontRef idx="minor">
+            <a:schemeClr val="lt1"/>
+          </a:fontRef>
+        </p:style>
+        <p:txBody>
+          <a:bodyPr lIns="0" rIns="0" rtlCol="0" anchor="ctr"/>
+          <a:lstStyle/>
+          <a:p>
+            <a:pPr algn="ctr"/>
+            <a:r>
+              <a:rPr lang="en-US" sz="1200" dirty="0">
+                <a:solidFill>
+                  <a:srgbClr val="000090"/>
+                </a:solidFill>
+              </a:rPr>
+              <a:t>Transaction Endorser Agreement</a:t>
+            </a:r>
+          </a:p>
+        </p:txBody>
+      </p:sp>
+    </p:spTree>
+    <p:extLst>
+      <p:ext uri="{BB962C8B-B14F-4D97-AF65-F5344CB8AC3E}">
+        <p14:creationId xmlns:p14="http://schemas.microsoft.com/office/powerpoint/2010/main" val="3434911032"/>
       </p:ext>
     </p:extLst>
   </p:cSld>

</xml_diff>